<commit_message>
Updates to Weekly Report and Schedule
</commit_message>
<xml_diff>
--- a/Documents/Meeting Updates/MarchingMasters-1006.pptx
+++ b/Documents/Meeting Updates/MarchingMasters-1006.pptx
@@ -314,7 +314,7 @@
           <a:p>
             <a:fld id="{76A6DF96-24C9-6049-963C-8A018557765F}" type="datetimeFigureOut">
               <a:rPr lang="en-US" smtClean="0"/>
-              <a:t>10/4/20</a:t>
+              <a:t>10/6/2020</a:t>
             </a:fld>
             <a:endParaRPr lang="en-US"/>
           </a:p>
@@ -512,7 +512,7 @@
           <a:p>
             <a:fld id="{76A6DF96-24C9-6049-963C-8A018557765F}" type="datetimeFigureOut">
               <a:rPr lang="en-US" smtClean="0"/>
-              <a:t>10/4/20</a:t>
+              <a:t>10/6/2020</a:t>
             </a:fld>
             <a:endParaRPr lang="en-US"/>
           </a:p>
@@ -720,7 +720,7 @@
           <a:p>
             <a:fld id="{76A6DF96-24C9-6049-963C-8A018557765F}" type="datetimeFigureOut">
               <a:rPr lang="en-US" smtClean="0"/>
-              <a:t>10/4/20</a:t>
+              <a:t>10/6/2020</a:t>
             </a:fld>
             <a:endParaRPr lang="en-US"/>
           </a:p>
@@ -918,7 +918,7 @@
           <a:p>
             <a:fld id="{76A6DF96-24C9-6049-963C-8A018557765F}" type="datetimeFigureOut">
               <a:rPr lang="en-US" smtClean="0"/>
-              <a:t>10/4/20</a:t>
+              <a:t>10/6/2020</a:t>
             </a:fld>
             <a:endParaRPr lang="en-US"/>
           </a:p>
@@ -1193,7 +1193,7 @@
           <a:p>
             <a:fld id="{76A6DF96-24C9-6049-963C-8A018557765F}" type="datetimeFigureOut">
               <a:rPr lang="en-US" smtClean="0"/>
-              <a:t>10/4/20</a:t>
+              <a:t>10/6/2020</a:t>
             </a:fld>
             <a:endParaRPr lang="en-US"/>
           </a:p>
@@ -1458,7 +1458,7 @@
           <a:p>
             <a:fld id="{76A6DF96-24C9-6049-963C-8A018557765F}" type="datetimeFigureOut">
               <a:rPr lang="en-US" smtClean="0"/>
-              <a:t>10/4/20</a:t>
+              <a:t>10/6/2020</a:t>
             </a:fld>
             <a:endParaRPr lang="en-US"/>
           </a:p>
@@ -1870,7 +1870,7 @@
           <a:p>
             <a:fld id="{76A6DF96-24C9-6049-963C-8A018557765F}" type="datetimeFigureOut">
               <a:rPr lang="en-US" smtClean="0"/>
-              <a:t>10/4/20</a:t>
+              <a:t>10/6/2020</a:t>
             </a:fld>
             <a:endParaRPr lang="en-US"/>
           </a:p>
@@ -2011,7 +2011,7 @@
           <a:p>
             <a:fld id="{76A6DF96-24C9-6049-963C-8A018557765F}" type="datetimeFigureOut">
               <a:rPr lang="en-US" smtClean="0"/>
-              <a:t>10/4/20</a:t>
+              <a:t>10/6/2020</a:t>
             </a:fld>
             <a:endParaRPr lang="en-US"/>
           </a:p>
@@ -2124,7 +2124,7 @@
           <a:p>
             <a:fld id="{76A6DF96-24C9-6049-963C-8A018557765F}" type="datetimeFigureOut">
               <a:rPr lang="en-US" smtClean="0"/>
-              <a:t>10/4/20</a:t>
+              <a:t>10/6/2020</a:t>
             </a:fld>
             <a:endParaRPr lang="en-US"/>
           </a:p>
@@ -2435,7 +2435,7 @@
           <a:p>
             <a:fld id="{76A6DF96-24C9-6049-963C-8A018557765F}" type="datetimeFigureOut">
               <a:rPr lang="en-US" smtClean="0"/>
-              <a:t>10/4/20</a:t>
+              <a:t>10/6/2020</a:t>
             </a:fld>
             <a:endParaRPr lang="en-US"/>
           </a:p>
@@ -2723,7 +2723,7 @@
           <a:p>
             <a:fld id="{76A6DF96-24C9-6049-963C-8A018557765F}" type="datetimeFigureOut">
               <a:rPr lang="en-US" smtClean="0"/>
-              <a:t>10/4/20</a:t>
+              <a:t>10/6/2020</a:t>
             </a:fld>
             <a:endParaRPr lang="en-US"/>
           </a:p>
@@ -2964,7 +2964,7 @@
           <a:p>
             <a:fld id="{76A6DF96-24C9-6049-963C-8A018557765F}" type="datetimeFigureOut">
               <a:rPr lang="en-US" smtClean="0"/>
-              <a:t>10/4/20</a:t>
+              <a:t>10/6/2020</a:t>
             </a:fld>
             <a:endParaRPr lang="en-US"/>
           </a:p>
@@ -4013,7 +4013,7 @@
             </a:pPr>
             <a:r>
               <a:rPr lang="en-US" dirty="0"/>
-              <a:t>Marching Masters is a mobile application which will provide a method of measuring a performer’s accuracy during a show by comparing the calculated position to the location written advancing the quality of marching arts programs.</a:t>
+              <a:t>Marching Masters is a mobile application which will provide a method of measuring a performer’s accuracy during a field performance by comparing the calculated position to the location written advancing the quality of marching arts programs.</a:t>
             </a:r>
           </a:p>
         </p:txBody>

</xml_diff>